<commit_message>
Development of the study
</commit_message>
<xml_diff>
--- a/Statistical Inference.pptx
+++ b/Statistical Inference.pptx
@@ -17,8 +17,8 @@
     <p:sldId id="262" r:id="rId8"/>
     <p:sldId id="263" r:id="rId9"/>
     <p:sldId id="264" r:id="rId10"/>
-    <p:sldId id="265" r:id="rId11"/>
-    <p:sldId id="266" r:id="rId12"/>
+    <p:sldId id="312" r:id="rId11"/>
+    <p:sldId id="265" r:id="rId12"/>
     <p:sldId id="267" r:id="rId13"/>
     <p:sldId id="268" r:id="rId14"/>
     <p:sldId id="269" r:id="rId15"/>
@@ -269,6 +269,11 @@
       </a:defRPr>
     </a:lvl9pPr>
   </p:defaultTextStyle>
+  <p:extLst>
+    <p:ext uri="{EFAFB233-063F-42B5-8137-9DF3F51BA10A}">
+      <p15:sldGuideLst xmlns:p15="http://schemas.microsoft.com/office/powerpoint/2012/main"/>
+    </p:ext>
+  </p:extLst>
 </p:presentation>
 </file>
 
@@ -1280,7 +1285,7 @@
   <p:cSld>
     <p:spTree>
       <p:nvGrpSpPr>
-        <p:cNvPr id="1" name="Shape 143"/>
+        <p:cNvPr id="1" name="Shape 150"/>
         <p:cNvGrpSpPr/>
         <p:nvPr/>
       </p:nvGrpSpPr>
@@ -1294,7 +1299,7 @@
       </p:grpSpPr>
       <p:sp>
         <p:nvSpPr>
-          <p:cNvPr id="144" name="Shape 144"/>
+          <p:cNvPr id="151" name="Shape 151"/>
           <p:cNvSpPr>
             <a:spLocks noGrp="1" noRot="1" noChangeAspect="1"/>
           </p:cNvSpPr>
@@ -1335,7 +1340,7 @@
       </p:sp>
       <p:sp>
         <p:nvSpPr>
-          <p:cNvPr id="145" name="Shape 145"/>
+          <p:cNvPr id="152" name="Shape 152"/>
           <p:cNvSpPr txBox="1">
             <a:spLocks noGrp="1"/>
           </p:cNvSpPr>
@@ -1370,7 +1375,7 @@
       </p:sp>
       <p:sp>
         <p:nvSpPr>
-          <p:cNvPr id="146" name="Shape 146"/>
+          <p:cNvPr id="153" name="Shape 153"/>
           <p:cNvSpPr txBox="1">
             <a:spLocks noGrp="1"/>
           </p:cNvSpPr>
@@ -1413,6 +1418,11 @@
         </p:txBody>
       </p:sp>
     </p:spTree>
+    <p:extLst>
+      <p:ext uri="{BB962C8B-B14F-4D97-AF65-F5344CB8AC3E}">
+        <p14:creationId xmlns:p14="http://schemas.microsoft.com/office/powerpoint/2010/main" val="400493300"/>
+      </p:ext>
+    </p:extLst>
   </p:cSld>
   <p:clrMapOvr>
     <a:masterClrMapping/>
@@ -1425,7 +1435,7 @@
   <p:cSld>
     <p:spTree>
       <p:nvGrpSpPr>
-        <p:cNvPr id="1" name="Shape 150"/>
+        <p:cNvPr id="1" name="Shape 143"/>
         <p:cNvGrpSpPr/>
         <p:nvPr/>
       </p:nvGrpSpPr>
@@ -1439,7 +1449,7 @@
       </p:grpSpPr>
       <p:sp>
         <p:nvSpPr>
-          <p:cNvPr id="151" name="Shape 151"/>
+          <p:cNvPr id="144" name="Shape 144"/>
           <p:cNvSpPr>
             <a:spLocks noGrp="1" noRot="1" noChangeAspect="1"/>
           </p:cNvSpPr>
@@ -1480,7 +1490,7 @@
       </p:sp>
       <p:sp>
         <p:nvSpPr>
-          <p:cNvPr id="152" name="Shape 152"/>
+          <p:cNvPr id="145" name="Shape 145"/>
           <p:cNvSpPr txBox="1">
             <a:spLocks noGrp="1"/>
           </p:cNvSpPr>
@@ -1515,7 +1525,7 @@
       </p:sp>
       <p:sp>
         <p:nvSpPr>
-          <p:cNvPr id="153" name="Shape 153"/>
+          <p:cNvPr id="146" name="Shape 146"/>
           <p:cNvSpPr txBox="1">
             <a:spLocks noGrp="1"/>
           </p:cNvSpPr>
@@ -19251,6 +19261,255 @@
   <p:cSld>
     <p:spTree>
       <p:nvGrpSpPr>
+        <p:cNvPr id="1" name="Shape 154"/>
+        <p:cNvGrpSpPr/>
+        <p:nvPr/>
+      </p:nvGrpSpPr>
+      <p:grpSpPr>
+        <a:xfrm>
+          <a:off x="0" y="0"/>
+          <a:ext cx="0" cy="0"/>
+          <a:chOff x="0" y="0"/>
+          <a:chExt cx="0" cy="0"/>
+        </a:xfrm>
+      </p:grpSpPr>
+      <p:sp>
+        <p:nvSpPr>
+          <p:cNvPr id="155" name="Shape 155"/>
+          <p:cNvSpPr txBox="1">
+            <a:spLocks noGrp="1"/>
+          </p:cNvSpPr>
+          <p:nvPr>
+            <p:ph type="title"/>
+          </p:nvPr>
+        </p:nvSpPr>
+        <p:spPr>
+          <a:xfrm>
+            <a:off x="838200" y="365125"/>
+            <a:ext cx="10515600" cy="1325700"/>
+          </a:xfrm>
+          <a:prstGeom prst="rect">
+            <a:avLst/>
+          </a:prstGeom>
+        </p:spPr>
+        <p:txBody>
+          <a:bodyPr lIns="91425" tIns="91425" rIns="91425" bIns="91425" anchor="ctr" anchorCtr="0">
+            <a:noAutofit/>
+          </a:bodyPr>
+          <a:lstStyle/>
+          <a:p>
+            <a:pPr lvl="0">
+              <a:spcBef>
+                <a:spcPts val="0"/>
+              </a:spcBef>
+              <a:buNone/>
+            </a:pPr>
+            <a:r>
+              <a:rPr lang="en-US"/>
+              <a:t>Useful Aside: Central Limit Theorem</a:t>
+            </a:r>
+          </a:p>
+        </p:txBody>
+      </p:sp>
+      <p:sp>
+        <p:nvSpPr>
+          <p:cNvPr id="156" name="Shape 156"/>
+          <p:cNvSpPr txBox="1">
+            <a:spLocks noGrp="1"/>
+          </p:cNvSpPr>
+          <p:nvPr>
+            <p:ph type="body" idx="1"/>
+          </p:nvPr>
+        </p:nvSpPr>
+        <p:spPr>
+          <a:xfrm>
+            <a:off x="838200" y="1825625"/>
+            <a:ext cx="10515600" cy="4351200"/>
+          </a:xfrm>
+          <a:prstGeom prst="rect">
+            <a:avLst/>
+          </a:prstGeom>
+        </p:spPr>
+        <p:txBody>
+          <a:bodyPr lIns="91425" tIns="91425" rIns="91425" bIns="91425" anchor="t" anchorCtr="0">
+            <a:noAutofit/>
+          </a:bodyPr>
+          <a:lstStyle/>
+          <a:p>
+            <a:pPr lvl="0">
+              <a:lnSpc>
+                <a:spcPct val="150000"/>
+              </a:lnSpc>
+              <a:spcBef>
+                <a:spcPts val="0"/>
+              </a:spcBef>
+              <a:buNone/>
+            </a:pPr>
+            <a:r>
+              <a:rPr lang="en-US" dirty="0"/>
+              <a:t>Given a </a:t>
+            </a:r>
+            <a:r>
+              <a:rPr lang="en-US" b="1" dirty="0"/>
+              <a:t>large enough</a:t>
+            </a:r>
+            <a:r>
+              <a:rPr lang="en-US" dirty="0"/>
+              <a:t> set of observations X</a:t>
+            </a:r>
+            <a:r>
+              <a:rPr lang="en-US" baseline="-25000" dirty="0"/>
+              <a:t>1</a:t>
+            </a:r>
+            <a:r>
+              <a:rPr lang="en-US" dirty="0"/>
+              <a:t>, X</a:t>
+            </a:r>
+            <a:r>
+              <a:rPr lang="en-US" baseline="-25000" dirty="0"/>
+              <a:t>2</a:t>
+            </a:r>
+            <a:r>
+              <a:rPr lang="en-US" dirty="0"/>
+              <a:t>, …, X</a:t>
+            </a:r>
+            <a:r>
+              <a:rPr lang="en-US" baseline="-25000" dirty="0"/>
+              <a:t>N</a:t>
+            </a:r>
+            <a:r>
+              <a:rPr lang="en-US" dirty="0"/>
+              <a:t>, the mean </a:t>
+            </a:r>
+          </a:p>
+          <a:p>
+            <a:pPr lvl="0" algn="ctr" rtl="0">
+              <a:lnSpc>
+                <a:spcPct val="150000"/>
+              </a:lnSpc>
+              <a:spcBef>
+                <a:spcPts val="0"/>
+              </a:spcBef>
+              <a:buNone/>
+            </a:pPr>
+            <a:r>
+              <a:rPr lang="en-US" dirty="0" err="1"/>
+              <a:t>μ</a:t>
+            </a:r>
+            <a:r>
+              <a:rPr lang="en-US" baseline="-25000" dirty="0" err="1"/>
+              <a:t>N</a:t>
+            </a:r>
+            <a:r>
+              <a:rPr lang="en-US" dirty="0"/>
+              <a:t> =  (X</a:t>
+            </a:r>
+            <a:r>
+              <a:rPr lang="en-US" baseline="-25000" dirty="0"/>
+              <a:t>1</a:t>
+            </a:r>
+            <a:r>
+              <a:rPr lang="en-US" dirty="0"/>
+              <a:t> + X</a:t>
+            </a:r>
+            <a:r>
+              <a:rPr lang="en-US" baseline="-25000" dirty="0"/>
+              <a:t>2</a:t>
+            </a:r>
+            <a:r>
+              <a:rPr lang="en-US" dirty="0"/>
+              <a:t> + … + X</a:t>
+            </a:r>
+            <a:r>
+              <a:rPr lang="en-US" baseline="-25000" dirty="0"/>
+              <a:t>N</a:t>
+            </a:r>
+            <a:r>
+              <a:rPr lang="en-US" dirty="0"/>
+              <a:t>)/N </a:t>
+            </a:r>
+          </a:p>
+          <a:p>
+            <a:pPr lvl="0">
+              <a:lnSpc>
+                <a:spcPct val="150000"/>
+              </a:lnSpc>
+              <a:spcBef>
+                <a:spcPts val="0"/>
+              </a:spcBef>
+              <a:buNone/>
+            </a:pPr>
+            <a:r>
+              <a:rPr lang="en-US" dirty="0"/>
+              <a:t>has an approximately Gaussian distribution, with variance</a:t>
+            </a:r>
+          </a:p>
+          <a:p>
+            <a:pPr lvl="0" algn="ctr">
+              <a:spcBef>
+                <a:spcPts val="0"/>
+              </a:spcBef>
+              <a:buNone/>
+            </a:pPr>
+            <a:r>
+              <a:rPr lang="en-US" dirty="0"/>
+              <a:t>σ</a:t>
+            </a:r>
+            <a:r>
+              <a:rPr lang="en-US" baseline="30000" dirty="0"/>
+              <a:t>2</a:t>
+            </a:r>
+            <a:r>
+              <a:rPr lang="en-US" baseline="-25000" dirty="0"/>
+              <a:t>N</a:t>
+            </a:r>
+            <a:r>
+              <a:rPr lang="en-US" dirty="0"/>
+              <a:t> = (sample variance)/N</a:t>
+            </a:r>
+            <a:endParaRPr lang="ru-RU" dirty="0"/>
+          </a:p>
+          <a:p>
+            <a:pPr lvl="0">
+              <a:spcBef>
+                <a:spcPts val="0"/>
+              </a:spcBef>
+              <a:buNone/>
+            </a:pPr>
+            <a:endParaRPr lang="ru-RU" dirty="0"/>
+          </a:p>
+          <a:p>
+            <a:pPr lvl="0">
+              <a:spcBef>
+                <a:spcPts val="0"/>
+              </a:spcBef>
+              <a:buNone/>
+            </a:pPr>
+            <a:r>
+              <a:rPr lang="en-US" dirty="0"/>
+              <a:t>N.B. But there are counterexamples – Cauchy!</a:t>
+            </a:r>
+          </a:p>
+        </p:txBody>
+      </p:sp>
+    </p:spTree>
+    <p:extLst>
+      <p:ext uri="{BB962C8B-B14F-4D97-AF65-F5344CB8AC3E}">
+        <p14:creationId xmlns:p14="http://schemas.microsoft.com/office/powerpoint/2010/main" val="2639859724"/>
+      </p:ext>
+    </p:extLst>
+  </p:cSld>
+  <p:clrMapOvr>
+    <a:masterClrMapping/>
+  </p:clrMapOvr>
+</p:sld>
+</file>
+
+<file path=ppt/slides/slide11.xml><?xml version="1.0" encoding="utf-8"?>
+<p:sld xmlns:a="http://schemas.openxmlformats.org/drawingml/2006/main" xmlns:r="http://schemas.openxmlformats.org/officeDocument/2006/relationships" xmlns:p="http://schemas.openxmlformats.org/presentationml/2006/main">
+  <p:cSld>
+    <p:spTree>
+      <p:nvGrpSpPr>
         <p:cNvPr id="1" name="Shape 147"/>
         <p:cNvGrpSpPr/>
         <p:nvPr/>
@@ -19421,228 +19680,6 @@
             <a:r>
               <a:rPr lang="en-US"/>
               <a:t> fair. </a:t>
-            </a:r>
-          </a:p>
-        </p:txBody>
-      </p:sp>
-    </p:spTree>
-  </p:cSld>
-  <p:clrMapOvr>
-    <a:masterClrMapping/>
-  </p:clrMapOvr>
-</p:sld>
-</file>
-
-<file path=ppt/slides/slide11.xml><?xml version="1.0" encoding="utf-8"?>
-<p:sld xmlns:a="http://schemas.openxmlformats.org/drawingml/2006/main" xmlns:r="http://schemas.openxmlformats.org/officeDocument/2006/relationships" xmlns:p="http://schemas.openxmlformats.org/presentationml/2006/main">
-  <p:cSld>
-    <p:spTree>
-      <p:nvGrpSpPr>
-        <p:cNvPr id="1" name="Shape 154"/>
-        <p:cNvGrpSpPr/>
-        <p:nvPr/>
-      </p:nvGrpSpPr>
-      <p:grpSpPr>
-        <a:xfrm>
-          <a:off x="0" y="0"/>
-          <a:ext cx="0" cy="0"/>
-          <a:chOff x="0" y="0"/>
-          <a:chExt cx="0" cy="0"/>
-        </a:xfrm>
-      </p:grpSpPr>
-      <p:sp>
-        <p:nvSpPr>
-          <p:cNvPr id="155" name="Shape 155"/>
-          <p:cNvSpPr txBox="1">
-            <a:spLocks noGrp="1"/>
-          </p:cNvSpPr>
-          <p:nvPr>
-            <p:ph type="title"/>
-          </p:nvPr>
-        </p:nvSpPr>
-        <p:spPr>
-          <a:xfrm>
-            <a:off x="838200" y="365125"/>
-            <a:ext cx="10515600" cy="1325700"/>
-          </a:xfrm>
-          <a:prstGeom prst="rect">
-            <a:avLst/>
-          </a:prstGeom>
-        </p:spPr>
-        <p:txBody>
-          <a:bodyPr lIns="91425" tIns="91425" rIns="91425" bIns="91425" anchor="ctr" anchorCtr="0">
-            <a:noAutofit/>
-          </a:bodyPr>
-          <a:lstStyle/>
-          <a:p>
-            <a:pPr lvl="0">
-              <a:spcBef>
-                <a:spcPts val="0"/>
-              </a:spcBef>
-              <a:buNone/>
-            </a:pPr>
-            <a:r>
-              <a:rPr lang="en-US"/>
-              <a:t>Useful Aside: Central Limit Theorem</a:t>
-            </a:r>
-          </a:p>
-        </p:txBody>
-      </p:sp>
-      <p:sp>
-        <p:nvSpPr>
-          <p:cNvPr id="156" name="Shape 156"/>
-          <p:cNvSpPr txBox="1">
-            <a:spLocks noGrp="1"/>
-          </p:cNvSpPr>
-          <p:nvPr>
-            <p:ph type="body" idx="1"/>
-          </p:nvPr>
-        </p:nvSpPr>
-        <p:spPr>
-          <a:xfrm>
-            <a:off x="838200" y="1825625"/>
-            <a:ext cx="10515600" cy="4351200"/>
-          </a:xfrm>
-          <a:prstGeom prst="rect">
-            <a:avLst/>
-          </a:prstGeom>
-        </p:spPr>
-        <p:txBody>
-          <a:bodyPr lIns="91425" tIns="91425" rIns="91425" bIns="91425" anchor="t" anchorCtr="0">
-            <a:noAutofit/>
-          </a:bodyPr>
-          <a:lstStyle/>
-          <a:p>
-            <a:pPr lvl="0">
-              <a:lnSpc>
-                <a:spcPct val="150000"/>
-              </a:lnSpc>
-              <a:spcBef>
-                <a:spcPts val="0"/>
-              </a:spcBef>
-              <a:buNone/>
-            </a:pPr>
-            <a:r>
-              <a:rPr lang="en-US"/>
-              <a:t>Given a </a:t>
-            </a:r>
-            <a:r>
-              <a:rPr lang="en-US" b="1"/>
-              <a:t>large enough</a:t>
-            </a:r>
-            <a:r>
-              <a:rPr lang="en-US"/>
-              <a:t> set of observations X</a:t>
-            </a:r>
-            <a:r>
-              <a:rPr lang="en-US" baseline="-25000"/>
-              <a:t>1</a:t>
-            </a:r>
-            <a:r>
-              <a:rPr lang="en-US"/>
-              <a:t>, X</a:t>
-            </a:r>
-            <a:r>
-              <a:rPr lang="en-US" baseline="-25000"/>
-              <a:t>2</a:t>
-            </a:r>
-            <a:r>
-              <a:rPr lang="en-US"/>
-              <a:t>, …, X</a:t>
-            </a:r>
-            <a:r>
-              <a:rPr lang="en-US" baseline="-25000"/>
-              <a:t>N</a:t>
-            </a:r>
-            <a:r>
-              <a:rPr lang="en-US"/>
-              <a:t>, the mean </a:t>
-            </a:r>
-          </a:p>
-          <a:p>
-            <a:pPr lvl="0" algn="ctr" rtl="0">
-              <a:lnSpc>
-                <a:spcPct val="150000"/>
-              </a:lnSpc>
-              <a:spcBef>
-                <a:spcPts val="0"/>
-              </a:spcBef>
-              <a:buNone/>
-            </a:pPr>
-            <a:r>
-              <a:rPr lang="en-US"/>
-              <a:t>μ</a:t>
-            </a:r>
-            <a:r>
-              <a:rPr lang="en-US" baseline="-25000"/>
-              <a:t>N</a:t>
-            </a:r>
-            <a:r>
-              <a:rPr lang="en-US"/>
-              <a:t> =  (X</a:t>
-            </a:r>
-            <a:r>
-              <a:rPr lang="en-US" baseline="-25000"/>
-              <a:t>1</a:t>
-            </a:r>
-            <a:r>
-              <a:rPr lang="en-US"/>
-              <a:t> + X</a:t>
-            </a:r>
-            <a:r>
-              <a:rPr lang="en-US" baseline="-25000"/>
-              <a:t>2</a:t>
-            </a:r>
-            <a:r>
-              <a:rPr lang="en-US"/>
-              <a:t> + … + X</a:t>
-            </a:r>
-            <a:r>
-              <a:rPr lang="en-US" baseline="-25000"/>
-              <a:t>N</a:t>
-            </a:r>
-            <a:r>
-              <a:rPr lang="en-US"/>
-              <a:t>)/N </a:t>
-            </a:r>
-          </a:p>
-          <a:p>
-            <a:pPr lvl="0">
-              <a:lnSpc>
-                <a:spcPct val="150000"/>
-              </a:lnSpc>
-              <a:spcBef>
-                <a:spcPts val="0"/>
-              </a:spcBef>
-              <a:buNone/>
-            </a:pPr>
-            <a:r>
-              <a:rPr lang="en-US"/>
-              <a:t>has an approximately Gaussian distribution, with variance</a:t>
-            </a:r>
-          </a:p>
-          <a:p>
-            <a:pPr lvl="0" algn="ctr">
-              <a:spcBef>
-                <a:spcPts val="0"/>
-              </a:spcBef>
-              <a:buNone/>
-            </a:pPr>
-            <a:r>
-              <a:rPr lang="en-US"/>
-              <a:t>σ</a:t>
-            </a:r>
-            <a:r>
-              <a:rPr lang="en-US" baseline="30000"/>
-              <a:t>2</a:t>
-            </a:r>
-            <a:r>
-              <a:rPr lang="en-US" baseline="-25000"/>
-              <a:t>N</a:t>
-            </a:r>
-            <a:r>
-              <a:rPr lang="en-US"/>
-              <a:t> = (sample variance)/N</a:t>
             </a:r>
           </a:p>
         </p:txBody>
@@ -19780,7 +19817,7 @@
               <a:buNone/>
             </a:pPr>
             <a:r>
-              <a:rPr lang="en-US" sz="2000"/>
+              <a:rPr lang="en-US" sz="2000" dirty="0"/>
               <a:t>Experiment 1:</a:t>
             </a:r>
           </a:p>
@@ -19792,7 +19829,7 @@
               <a:buNone/>
             </a:pPr>
             <a:r>
-              <a:rPr lang="en-US" sz="2000"/>
+              <a:rPr lang="en-US" sz="2000" dirty="0"/>
               <a:t>44 HEADS, 56 TAILS - mean = 0.56 </a:t>
             </a:r>
           </a:p>
@@ -19803,7 +19840,7 @@
               </a:spcBef>
               <a:buNone/>
             </a:pPr>
-            <a:endParaRPr sz="2000"/>
+            <a:endParaRPr sz="2000" dirty="0"/>
           </a:p>
           <a:p>
             <a:pPr lvl="0">
@@ -19813,7 +19850,7 @@
               <a:buNone/>
             </a:pPr>
             <a:r>
-              <a:rPr lang="en-US" sz="2000"/>
+              <a:rPr lang="en-US" sz="2000" dirty="0"/>
               <a:t>Experiment 2:</a:t>
             </a:r>
           </a:p>
@@ -19825,7 +19862,7 @@
               <a:buNone/>
             </a:pPr>
             <a:r>
-              <a:rPr lang="en-US" sz="2000"/>
+              <a:rPr lang="en-US" sz="2000" dirty="0"/>
               <a:t>62 HEADS, 38 TAILS - mean = 0.38</a:t>
             </a:r>
           </a:p>
@@ -19836,7 +19873,7 @@
               </a:spcBef>
               <a:buNone/>
             </a:pPr>
-            <a:endParaRPr sz="2000"/>
+            <a:endParaRPr sz="2000" dirty="0"/>
           </a:p>
           <a:p>
             <a:pPr lvl="0">
@@ -19846,7 +19883,7 @@
               <a:buNone/>
             </a:pPr>
             <a:r>
-              <a:rPr lang="en-US" sz="2000"/>
+              <a:rPr lang="en-US" sz="2000" dirty="0"/>
               <a:t>Experiment 3:</a:t>
             </a:r>
           </a:p>
@@ -19858,7 +19895,7 @@
               <a:buNone/>
             </a:pPr>
             <a:r>
-              <a:rPr lang="en-US" sz="2000"/>
+              <a:rPr lang="en-US" sz="2000" dirty="0"/>
               <a:t>56 HEADS, 44 TAILS - mean = 0.44</a:t>
             </a:r>
           </a:p>
@@ -19869,7 +19906,7 @@
               </a:spcBef>
               <a:buNone/>
             </a:pPr>
-            <a:endParaRPr sz="2000"/>
+            <a:endParaRPr sz="2000" dirty="0"/>
           </a:p>
           <a:p>
             <a:pPr lvl="0">
@@ -19879,7 +19916,7 @@
               <a:buNone/>
             </a:pPr>
             <a:r>
-              <a:rPr lang="en-US" sz="2000"/>
+              <a:rPr lang="en-US" sz="2000" dirty="0"/>
               <a:t>Experiment 4:</a:t>
             </a:r>
           </a:p>
@@ -19891,7 +19928,7 @@
               <a:buNone/>
             </a:pPr>
             <a:r>
-              <a:rPr lang="en-US" sz="2000"/>
+              <a:rPr lang="en-US" sz="2000" dirty="0"/>
               <a:t>45 HEADS, 55 TAILS - mean = 0.55</a:t>
             </a:r>
           </a:p>
@@ -20479,7 +20516,7 @@
               <a:buNone/>
             </a:pPr>
             <a:r>
-              <a:rPr lang="en-US"/>
+              <a:rPr lang="en-US" dirty="0"/>
               <a:t>Confidence Interval and p-value</a:t>
             </a:r>
           </a:p>
@@ -20529,8 +20566,8 @@
         </p:blipFill>
         <p:spPr>
           <a:xfrm>
-            <a:off x="2609850" y="1581150"/>
-            <a:ext cx="6972300" cy="4000500"/>
+            <a:off x="2609850" y="1357732"/>
+            <a:ext cx="6972300" cy="4217567"/>
           </a:xfrm>
           <a:prstGeom prst="rect">
             <a:avLst/>
@@ -21038,15 +21075,15 @@
               </a:spcBef>
             </a:pPr>
             <a:r>
-              <a:rPr lang="en-US"/>
+              <a:rPr lang="en-US" dirty="0"/>
               <a:t>Testing the null hypothesis using </a:t>
             </a:r>
             <a:r>
-              <a:rPr lang="en-US" b="1"/>
+              <a:rPr lang="en-US" b="1" dirty="0"/>
               <a:t>confidence interval</a:t>
             </a:r>
             <a:r>
-              <a:rPr lang="en-US"/>
+              <a:rPr lang="en-US" dirty="0"/>
               <a:t>:</a:t>
             </a:r>
           </a:p>
@@ -21060,23 +21097,23 @@
               </a:spcBef>
             </a:pPr>
             <a:r>
-              <a:rPr lang="en-US"/>
+              <a:rPr lang="en-US" dirty="0"/>
               <a:t>select a desired </a:t>
             </a:r>
             <a:r>
-              <a:rPr lang="en-US" b="1"/>
+              <a:rPr lang="en-US" b="1" dirty="0"/>
               <a:t>confidence level</a:t>
             </a:r>
             <a:r>
-              <a:rPr lang="en-US"/>
+              <a:rPr lang="en-US" dirty="0"/>
               <a:t> </a:t>
             </a:r>
             <a:r>
-              <a:rPr lang="en-US" i="1"/>
+              <a:rPr lang="en-US" i="1" dirty="0"/>
               <a:t>c</a:t>
             </a:r>
             <a:r>
-              <a:rPr lang="en-US"/>
+              <a:rPr lang="en-US" dirty="0"/>
               <a:t> (usually 5%)</a:t>
             </a:r>
           </a:p>
@@ -21090,23 +21127,23 @@
               </a:spcBef>
             </a:pPr>
             <a:r>
-              <a:rPr lang="en-US"/>
+              <a:rPr lang="en-US" dirty="0"/>
               <a:t>under the null hypothesis, what is the interval that contains the outcome of the experiment with probability </a:t>
             </a:r>
             <a:r>
-              <a:rPr lang="en-US" i="1"/>
+              <a:rPr lang="en-US" i="1" dirty="0"/>
               <a:t>(1-c)%</a:t>
             </a:r>
             <a:r>
-              <a:rPr lang="en-US"/>
+              <a:rPr lang="en-US" dirty="0"/>
               <a:t> (95% for </a:t>
             </a:r>
             <a:r>
-              <a:rPr lang="en-US" i="1"/>
+              <a:rPr lang="en-US" i="1" dirty="0"/>
               <a:t>c = 5%</a:t>
             </a:r>
             <a:r>
-              <a:rPr lang="en-US"/>
+              <a:rPr lang="en-US" dirty="0"/>
               <a:t>)?</a:t>
             </a:r>
           </a:p>
@@ -21120,13 +21157,25 @@
               </a:spcBef>
             </a:pPr>
             <a:r>
-              <a:rPr lang="en-US" b="1"/>
+              <a:rPr lang="en-US" b="1" dirty="0"/>
               <a:t>reject the null hypothesis</a:t>
             </a:r>
             <a:r>
-              <a:rPr lang="en-US"/>
+              <a:rPr lang="en-US" dirty="0"/>
               <a:t> if the observed value lies outside the confidence interval.</a:t>
             </a:r>
+          </a:p>
+          <a:p>
+            <a:pPr marL="609600" lvl="1" indent="0" rtl="0">
+              <a:lnSpc>
+                <a:spcPct val="70000"/>
+              </a:lnSpc>
+              <a:spcBef>
+                <a:spcPts val="0"/>
+              </a:spcBef>
+              <a:buNone/>
+            </a:pPr>
+            <a:endParaRPr lang="en-US" dirty="0"/>
           </a:p>
           <a:p>
             <a:pPr lvl="0" rtl="0">
@@ -21138,15 +21187,15 @@
               </a:spcBef>
             </a:pPr>
             <a:r>
-              <a:rPr lang="en-US"/>
+              <a:rPr lang="en-US" dirty="0"/>
               <a:t>Testing the null hypothesis using </a:t>
             </a:r>
             <a:r>
-              <a:rPr lang="en-US" b="1"/>
+              <a:rPr lang="en-US" b="1" dirty="0"/>
               <a:t>p-value</a:t>
             </a:r>
             <a:r>
-              <a:rPr lang="en-US"/>
+              <a:rPr lang="en-US" dirty="0"/>
               <a:t>:</a:t>
             </a:r>
           </a:p>
@@ -21160,15 +21209,15 @@
               </a:spcBef>
             </a:pPr>
             <a:r>
-              <a:rPr lang="en-US"/>
+              <a:rPr lang="en-US" dirty="0"/>
               <a:t>given an observed value, what is the probability (under the null hypothesis) that an outcome will have a value </a:t>
             </a:r>
             <a:r>
-              <a:rPr lang="en-US" b="1"/>
+              <a:rPr lang="en-US" b="1" dirty="0"/>
               <a:t>at least as extreme</a:t>
             </a:r>
             <a:r>
-              <a:rPr lang="en-US"/>
+              <a:rPr lang="en-US" dirty="0"/>
               <a:t> as the observed?</a:t>
             </a:r>
           </a:p>
@@ -21182,11 +21231,11 @@
               </a:spcBef>
             </a:pPr>
             <a:r>
-              <a:rPr lang="en-US" b="1"/>
+              <a:rPr lang="en-US" b="1" dirty="0"/>
               <a:t>reject the null hypothesis</a:t>
             </a:r>
             <a:r>
-              <a:rPr lang="en-US"/>
+              <a:rPr lang="en-US" dirty="0"/>
               <a:t> if the above probability is smaller than some threshold (usually 5%). </a:t>
             </a:r>
           </a:p>
@@ -21287,7 +21336,7 @@
               <a:buNone/>
             </a:pPr>
             <a:r>
-              <a:rPr lang="en-US" sz="2800">
+              <a:rPr lang="en-US" sz="2800" dirty="0">
                 <a:latin typeface="Calibri"/>
                 <a:ea typeface="Calibri"/>
                 <a:cs typeface="Calibri"/>
@@ -21304,7 +21353,7 @@
               <a:buNone/>
             </a:pPr>
             <a:r>
-              <a:rPr lang="en-US" sz="2800">
+              <a:rPr lang="en-US" sz="2800" dirty="0">
                 <a:latin typeface="Calibri"/>
                 <a:ea typeface="Calibri"/>
                 <a:cs typeface="Calibri"/>
@@ -24664,7 +24713,7 @@
               <a:buChar char="•"/>
             </a:pPr>
             <a:r>
-              <a:rPr lang="en-US" sz="2600" b="0" i="0" u="none" strike="noStrike" cap="none">
+              <a:rPr lang="en-US" sz="2600" b="0" i="0" u="none" strike="noStrike" cap="none" dirty="0">
                 <a:solidFill>
                   <a:schemeClr val="dk1"/>
                 </a:solidFill>
@@ -24676,7 +24725,7 @@
               <a:t>State the relevant </a:t>
             </a:r>
             <a:r>
-              <a:rPr lang="en-US" sz="2600" b="1" i="0" u="none" strike="noStrike" cap="none">
+              <a:rPr lang="en-US" sz="2600" b="1" i="0" u="none" strike="noStrike" cap="none" dirty="0">
                 <a:solidFill>
                   <a:schemeClr val="dk1"/>
                 </a:solidFill>
@@ -24688,7 +24737,7 @@
               <a:t>null and alternative hypotheses, </a:t>
             </a:r>
             <a:r>
-              <a:rPr lang="en-US" sz="2600" b="1" i="1" u="none" strike="noStrike" cap="none">
+              <a:rPr lang="en-US" sz="2600" b="1" i="1" u="none" strike="noStrike" cap="none" dirty="0">
                 <a:solidFill>
                   <a:schemeClr val="dk1"/>
                 </a:solidFill>
@@ -24700,7 +24749,7 @@
               <a:t>H</a:t>
             </a:r>
             <a:r>
-              <a:rPr lang="en-US" sz="2600" b="1" i="1" u="none" strike="noStrike" cap="none" baseline="-25000">
+              <a:rPr lang="en-US" sz="2600" b="1" i="1" u="none" strike="noStrike" cap="none" baseline="-25000" dirty="0">
                 <a:solidFill>
                   <a:schemeClr val="dk1"/>
                 </a:solidFill>
@@ -24712,7 +24761,7 @@
               <a:t>0 </a:t>
             </a:r>
             <a:r>
-              <a:rPr lang="en-US" sz="2600" b="1" i="0" u="none" strike="noStrike" cap="none">
+              <a:rPr lang="en-US" sz="2600" b="1" i="0" u="none" strike="noStrike" cap="none" dirty="0">
                 <a:solidFill>
                   <a:schemeClr val="dk1"/>
                 </a:solidFill>
@@ -24724,7 +24773,7 @@
               <a:t>and </a:t>
             </a:r>
             <a:r>
-              <a:rPr lang="en-US" sz="2600" b="1" i="1" u="none" strike="noStrike" cap="none">
+              <a:rPr lang="en-US" sz="2600" b="1" i="1" u="none" strike="noStrike" cap="none" dirty="0">
                 <a:solidFill>
                   <a:schemeClr val="dk1"/>
                 </a:solidFill>
@@ -24736,7 +24785,7 @@
               <a:t>H</a:t>
             </a:r>
             <a:r>
-              <a:rPr lang="en-US" sz="2600" b="1" i="1" u="none" strike="noStrike" cap="none" baseline="-25000">
+              <a:rPr lang="en-US" sz="2600" b="1" i="1" u="none" strike="noStrike" cap="none" baseline="-25000" dirty="0">
                 <a:solidFill>
                   <a:schemeClr val="dk1"/>
                 </a:solidFill>
@@ -24748,7 +24797,7 @@
               <a:t>1</a:t>
             </a:r>
             <a:r>
-              <a:rPr lang="en-US" sz="2600" b="0" i="1" u="none" strike="noStrike" cap="none">
+              <a:rPr lang="en-US" sz="2600" b="0" i="1" u="none" strike="noStrike" cap="none" dirty="0">
                 <a:solidFill>
                   <a:schemeClr val="dk1"/>
                 </a:solidFill>
@@ -24779,7 +24828,7 @@
               <a:buChar char="•"/>
             </a:pPr>
             <a:r>
-              <a:rPr lang="en-US" sz="2600" b="0" i="0" u="none" strike="noStrike" cap="none">
+              <a:rPr lang="en-US" sz="2600" b="0" i="0" u="none" strike="noStrike" cap="none" dirty="0">
                 <a:solidFill>
                   <a:schemeClr val="dk1"/>
                 </a:solidFill>
@@ -24791,7 +24840,7 @@
               <a:t>Consider the </a:t>
             </a:r>
             <a:r>
-              <a:rPr lang="en-US" sz="2600" b="0" i="0" u="sng" strike="noStrike" cap="none">
+              <a:rPr lang="en-US" sz="2600" b="0" i="0" u="sng" strike="noStrike" cap="none" dirty="0">
                 <a:solidFill>
                   <a:schemeClr val="hlink"/>
                 </a:solidFill>
@@ -24804,7 +24853,7 @@
               <a:t>statistical assumptions</a:t>
             </a:r>
             <a:r>
-              <a:rPr lang="en-US" sz="2600" b="0" i="0" u="none" strike="noStrike" cap="none">
+              <a:rPr lang="en-US" sz="2600" b="0" i="0" u="none" strike="noStrike" cap="none" dirty="0">
                 <a:solidFill>
                   <a:schemeClr val="dk1"/>
                 </a:solidFill>
@@ -24835,7 +24884,7 @@
               <a:buChar char="•"/>
             </a:pPr>
             <a:r>
-              <a:rPr lang="en-US" sz="2600" b="0" i="0" u="none" strike="noStrike" cap="none">
+              <a:rPr lang="en-US" sz="2600" b="0" i="0" u="none" strike="noStrike" cap="none" dirty="0">
                 <a:solidFill>
                   <a:schemeClr val="dk1"/>
                 </a:solidFill>
@@ -24847,7 +24896,7 @@
               <a:t>Decide which test is appropriate and state the relevant </a:t>
             </a:r>
             <a:r>
-              <a:rPr lang="en-US" sz="2600" b="1" i="1" u="sng" strike="noStrike" cap="none">
+              <a:rPr lang="en-US" sz="2600" b="1" i="1" u="sng" strike="noStrike" cap="none" dirty="0">
                 <a:solidFill>
                   <a:schemeClr val="hlink"/>
                 </a:solidFill>
@@ -24860,7 +24909,7 @@
               <a:t>test statistic</a:t>
             </a:r>
             <a:r>
-              <a:rPr lang="en-US" sz="2600" b="0" i="1" u="sng" strike="noStrike" cap="none">
+              <a:rPr lang="en-US" sz="2600" b="0" i="1" u="sng" strike="noStrike" cap="none" dirty="0">
                 <a:solidFill>
                   <a:srgbClr val="3366FF"/>
                 </a:solidFill>
@@ -24891,7 +24940,7 @@
               <a:buChar char="•"/>
             </a:pPr>
             <a:r>
-              <a:rPr lang="en-US" sz="2600" b="0" i="0" u="none" strike="noStrike" cap="none">
+              <a:rPr lang="en-US" sz="2600" b="0" i="0" u="none" strike="noStrike" cap="none" dirty="0">
                 <a:solidFill>
                   <a:schemeClr val="dk1"/>
                 </a:solidFill>
@@ -24922,7 +24971,7 @@
               <a:buChar char="•"/>
             </a:pPr>
             <a:r>
-              <a:rPr lang="en-US" sz="2600" b="0" i="0" u="none" strike="noStrike" cap="none">
+              <a:rPr lang="en-US" sz="2600" b="0" i="0" u="none" strike="noStrike" cap="none" dirty="0">
                 <a:solidFill>
                   <a:schemeClr val="dk1"/>
                 </a:solidFill>
@@ -24934,7 +24983,7 @@
               <a:t>Select a </a:t>
             </a:r>
             <a:r>
-              <a:rPr lang="en-US" sz="2600" b="0" i="1" u="sng" strike="noStrike" cap="none">
+              <a:rPr lang="en-US" sz="2600" b="0" i="1" u="sng" strike="noStrike" cap="none" dirty="0">
                 <a:solidFill>
                   <a:srgbClr val="3366FF"/>
                 </a:solidFill>
@@ -24946,7 +24995,7 @@
               <a:t>significance level (α)</a:t>
             </a:r>
             <a:r>
-              <a:rPr lang="en-US" sz="2600" b="0" i="1" u="none" strike="noStrike" cap="none">
+              <a:rPr lang="en-US" sz="2600" b="0" i="1" u="none" strike="noStrike" cap="none" dirty="0">
                 <a:solidFill>
                   <a:srgbClr val="3366FF"/>
                 </a:solidFill>
@@ -24958,7 +25007,7 @@
               <a:t>, </a:t>
             </a:r>
             <a:r>
-              <a:rPr lang="en-US" sz="2600" b="0" i="0" u="none" strike="noStrike" cap="none">
+              <a:rPr lang="en-US" sz="2600" b="0" i="0" u="none" strike="noStrike" cap="none" dirty="0">
                 <a:solidFill>
                   <a:schemeClr val="dk1"/>
                 </a:solidFill>
@@ -24989,7 +25038,7 @@
               <a:buChar char="•"/>
             </a:pPr>
             <a:r>
-              <a:rPr lang="en-US" sz="2600" b="0" i="0" u="none" strike="noStrike" cap="none">
+              <a:rPr lang="en-US" sz="2600" b="0" i="0" u="none" strike="noStrike" cap="none" dirty="0">
                 <a:solidFill>
                   <a:schemeClr val="dk1"/>
                 </a:solidFill>
@@ -25001,7 +25050,7 @@
               <a:t>Partition the values of </a:t>
             </a:r>
             <a:r>
-              <a:rPr lang="en-US" sz="2600" b="0" i="1" u="none" strike="noStrike" cap="none">
+              <a:rPr lang="en-US" sz="2600" b="0" i="1" u="none" strike="noStrike" cap="none" dirty="0">
                 <a:solidFill>
                   <a:schemeClr val="dk1"/>
                 </a:solidFill>
@@ -25013,7 +25062,7 @@
               <a:t>T</a:t>
             </a:r>
             <a:r>
-              <a:rPr lang="en-US" sz="2600" b="0" i="0" u="none" strike="noStrike" cap="none">
+              <a:rPr lang="en-US" sz="2600" b="0" i="0" u="none" strike="noStrike" cap="none" dirty="0">
                 <a:solidFill>
                   <a:schemeClr val="dk1"/>
                 </a:solidFill>
@@ -25025,7 +25074,7 @@
               <a:t> into the so-called</a:t>
             </a:r>
             <a:r>
-              <a:rPr lang="en-US" sz="2600" b="0" i="0" u="none" strike="noStrike" cap="none">
+              <a:rPr lang="en-US" sz="2600" b="0" i="0" u="none" strike="noStrike" cap="none" dirty="0">
                 <a:solidFill>
                   <a:srgbClr val="3366FF"/>
                 </a:solidFill>
@@ -25037,7 +25086,7 @@
               <a:t> </a:t>
             </a:r>
             <a:r>
-              <a:rPr lang="en-US" sz="2600" b="0" i="1" u="none" strike="noStrike" cap="none">
+              <a:rPr lang="en-US" sz="2600" b="0" i="1" u="none" strike="noStrike" cap="none" dirty="0">
                 <a:solidFill>
                   <a:srgbClr val="3366FF"/>
                 </a:solidFill>
@@ -25049,7 +25098,7 @@
               <a:t>critical region</a:t>
             </a:r>
             <a:r>
-              <a:rPr lang="en-US" sz="2600" b="0" i="0" u="none" strike="noStrike" cap="none">
+              <a:rPr lang="en-US" sz="2600" b="0" i="0" u="none" strike="noStrike" cap="none" dirty="0">
                 <a:solidFill>
                   <a:srgbClr val="3366FF"/>
                 </a:solidFill>
@@ -25061,7 +25110,7 @@
               <a:t> </a:t>
             </a:r>
             <a:r>
-              <a:rPr lang="en-US" sz="2600" b="0" i="0" u="none" strike="noStrike" cap="none">
+              <a:rPr lang="en-US" sz="2600" b="0" i="0" u="none" strike="noStrike" cap="none" dirty="0">
                 <a:solidFill>
                   <a:schemeClr val="dk1"/>
                 </a:solidFill>
@@ -25092,7 +25141,7 @@
               <a:buChar char="•"/>
             </a:pPr>
             <a:r>
-              <a:rPr lang="en-US" sz="2600" b="0" i="0" u="none" strike="noStrike" cap="none">
+              <a:rPr lang="en-US" sz="2600" b="0" i="0" u="none" strike="noStrike" cap="none" dirty="0">
                 <a:solidFill>
                   <a:schemeClr val="dk1"/>
                 </a:solidFill>
@@ -25104,7 +25153,7 @@
               <a:t>Compute from the observations the observed value </a:t>
             </a:r>
             <a:r>
-              <a:rPr lang="en-US" sz="2600" b="0" i="1" u="none" strike="noStrike" cap="none">
+              <a:rPr lang="en-US" sz="2600" b="0" i="1" u="none" strike="noStrike" cap="none" dirty="0" err="1">
                 <a:solidFill>
                   <a:schemeClr val="dk1"/>
                 </a:solidFill>
@@ -25116,7 +25165,7 @@
               <a:t>t</a:t>
             </a:r>
             <a:r>
-              <a:rPr lang="en-US" sz="2600" b="0" i="0" u="none" strike="noStrike" cap="none" baseline="-25000">
+              <a:rPr lang="en-US" sz="2600" b="0" i="0" u="none" strike="noStrike" cap="none" baseline="-25000" dirty="0" err="1">
                 <a:solidFill>
                   <a:schemeClr val="dk1"/>
                 </a:solidFill>
@@ -25128,7 +25177,7 @@
               <a:t>obs</a:t>
             </a:r>
             <a:r>
-              <a:rPr lang="en-US" sz="2600" b="0" i="0" u="none" strike="noStrike" cap="none">
+              <a:rPr lang="en-US" sz="2600" b="0" i="0" u="none" strike="noStrike" cap="none" dirty="0">
                 <a:solidFill>
                   <a:schemeClr val="dk1"/>
                 </a:solidFill>
@@ -25140,7 +25189,7 @@
               <a:t> of the test statistic </a:t>
             </a:r>
             <a:r>
-              <a:rPr lang="en-US" sz="2600" b="0" i="1" u="none" strike="noStrike" cap="none">
+              <a:rPr lang="en-US" sz="2600" b="0" i="1" u="none" strike="noStrike" cap="none" dirty="0">
                 <a:solidFill>
                   <a:schemeClr val="dk1"/>
                 </a:solidFill>
@@ -25152,7 +25201,7 @@
               <a:t>T</a:t>
             </a:r>
             <a:r>
-              <a:rPr lang="en-US" sz="2600" b="0" i="0" u="none" strike="noStrike" cap="none">
+              <a:rPr lang="en-US" sz="2600" b="0" i="0" u="none" strike="noStrike" cap="none" dirty="0">
                 <a:solidFill>
                   <a:schemeClr val="dk1"/>
                 </a:solidFill>
@@ -25183,7 +25232,7 @@
               <a:buChar char="•"/>
             </a:pPr>
             <a:r>
-              <a:rPr lang="en-US" sz="2600" b="0" i="0" u="none" strike="noStrike" cap="none">
+              <a:rPr lang="en-US" sz="2600" b="0" i="0" u="none" strike="noStrike" cap="none" dirty="0">
                 <a:solidFill>
                   <a:schemeClr val="dk1"/>
                 </a:solidFill>
@@ -25195,7 +25244,7 @@
               <a:t>Decide to either reject the null hypothesis </a:t>
             </a:r>
             <a:r>
-              <a:rPr lang="en-US" sz="2600" b="0" i="1" u="none" strike="noStrike" cap="none">
+              <a:rPr lang="en-US" sz="2600" b="0" i="1" u="none" strike="noStrike" cap="none" dirty="0">
                 <a:solidFill>
                   <a:schemeClr val="dk1"/>
                 </a:solidFill>
@@ -25207,7 +25256,7 @@
               <a:t>H</a:t>
             </a:r>
             <a:r>
-              <a:rPr lang="en-US" sz="2600" b="0" i="1" u="none" strike="noStrike" cap="none" baseline="-25000">
+              <a:rPr lang="en-US" sz="2600" b="0" i="1" u="none" strike="noStrike" cap="none" baseline="-25000" dirty="0">
                 <a:solidFill>
                   <a:schemeClr val="dk1"/>
                 </a:solidFill>
@@ -25219,7 +25268,7 @@
               <a:t>0 </a:t>
             </a:r>
             <a:r>
-              <a:rPr lang="en-US" sz="2600" b="0" i="0" u="none" strike="noStrike" cap="none">
+              <a:rPr lang="en-US" sz="2600" b="0" i="0" u="none" strike="noStrike" cap="none" dirty="0">
                 <a:solidFill>
                   <a:schemeClr val="dk1"/>
                 </a:solidFill>
@@ -25231,7 +25280,7 @@
               <a:t>in favor of the alternative </a:t>
             </a:r>
             <a:r>
-              <a:rPr lang="en-US" sz="2600" b="0" i="1" u="none" strike="noStrike" cap="none">
+              <a:rPr lang="en-US" sz="2600" b="0" i="1" u="none" strike="noStrike" cap="none" dirty="0">
                 <a:solidFill>
                   <a:schemeClr val="dk1"/>
                 </a:solidFill>
@@ -25243,7 +25292,7 @@
               <a:t>H</a:t>
             </a:r>
             <a:r>
-              <a:rPr lang="en-US" sz="2600" b="0" i="1" u="none" strike="noStrike" cap="none" baseline="-25000">
+              <a:rPr lang="en-US" sz="2600" b="0" i="1" u="none" strike="noStrike" cap="none" baseline="-25000" dirty="0">
                 <a:solidFill>
                   <a:schemeClr val="dk1"/>
                 </a:solidFill>
@@ -25255,7 +25304,7 @@
               <a:t>1 </a:t>
             </a:r>
             <a:r>
-              <a:rPr lang="en-US" sz="2600" b="0" i="0" u="none" strike="noStrike" cap="none">
+              <a:rPr lang="en-US" sz="2600" b="0" i="0" u="none" strike="noStrike" cap="none" dirty="0">
                 <a:solidFill>
                   <a:schemeClr val="dk1"/>
                 </a:solidFill>
@@ -25357,7 +25406,7 @@
         <p:spPr>
           <a:xfrm>
             <a:off x="838200" y="1215175"/>
-            <a:ext cx="10515600" cy="2849400"/>
+            <a:ext cx="10098386" cy="2098393"/>
           </a:xfrm>
           <a:prstGeom prst="rect">
             <a:avLst/>
@@ -25390,7 +25439,7 @@
               <a:buFont typeface="Arial"/>
             </a:pPr>
             <a:r>
-              <a:rPr lang="en-US" sz="2800" b="0" i="0" u="none" strike="noStrike" cap="none">
+              <a:rPr lang="en-US" sz="2800" b="0" i="0" u="none" strike="noStrike" cap="none" dirty="0">
                 <a:solidFill>
                   <a:schemeClr val="dk1"/>
                 </a:solidFill>
@@ -25402,11 +25451,11 @@
               <a:t>Statistical inference is used to make</a:t>
             </a:r>
             <a:r>
-              <a:rPr lang="en-US"/>
+              <a:rPr lang="en-US" dirty="0"/>
               <a:t> general statements </a:t>
             </a:r>
             <a:r>
-              <a:rPr lang="en-US" sz="2800" b="0" i="0" u="none" strike="noStrike" cap="none">
+              <a:rPr lang="en-US" sz="2800" b="0" i="0" u="none" strike="noStrike" cap="none" dirty="0">
                 <a:solidFill>
                   <a:schemeClr val="dk1"/>
                 </a:solidFill>
@@ -25418,7 +25467,7 @@
               <a:t>about a</a:t>
             </a:r>
             <a:r>
-              <a:rPr lang="en-US" sz="2800" b="0" i="0" u="sng" strike="noStrike" cap="none">
+              <a:rPr lang="en-US" sz="2800" b="0" i="0" u="sng" strike="noStrike" cap="none" dirty="0">
                 <a:solidFill>
                   <a:schemeClr val="dk1"/>
                 </a:solidFill>
@@ -25430,7 +25479,7 @@
               <a:t> </a:t>
             </a:r>
             <a:r>
-              <a:rPr lang="en-US" sz="2800" b="0" i="0" u="sng" strike="noStrike" cap="none">
+              <a:rPr lang="en-US" sz="2800" b="0" i="0" u="sng" strike="noStrike" cap="none" dirty="0">
                 <a:solidFill>
                   <a:srgbClr val="3366FF"/>
                 </a:solidFill>
@@ -25442,7 +25491,7 @@
               <a:t>population</a:t>
             </a:r>
             <a:r>
-              <a:rPr lang="en-US" sz="2800" b="0" i="0" u="none" strike="noStrike" cap="none">
+              <a:rPr lang="en-US" sz="2800" b="0" i="0" u="none" strike="noStrike" cap="none" dirty="0">
                 <a:solidFill>
                   <a:srgbClr val="3366FF"/>
                 </a:solidFill>
@@ -25454,7 +25503,7 @@
               <a:t>,</a:t>
             </a:r>
             <a:r>
-              <a:rPr lang="en-US">
+              <a:rPr lang="en-US" dirty="0">
                 <a:solidFill>
                   <a:srgbClr val="3366FF"/>
                 </a:solidFill>
@@ -25462,7 +25511,7 @@
               <a:t> </a:t>
             </a:r>
             <a:r>
-              <a:rPr lang="en-US">
+              <a:rPr lang="en-US" dirty="0">
                 <a:solidFill>
                   <a:srgbClr val="000000"/>
                 </a:solidFill>
@@ -25470,7 +25519,7 @@
               <a:t>when we only have access to information about a (hopefully representative!) subset of population, usually chosen through some</a:t>
             </a:r>
             <a:r>
-              <a:rPr lang="en-US">
+              <a:rPr lang="en-US" dirty="0">
                 <a:solidFill>
                   <a:srgbClr val="3366FF"/>
                 </a:solidFill>
@@ -25478,7 +25527,7 @@
               <a:t> </a:t>
             </a:r>
             <a:r>
-              <a:rPr lang="en-US" sz="2800" b="0" i="0" u="none" strike="noStrike" cap="none">
+              <a:rPr lang="en-US" sz="2800" b="0" i="0" u="none" strike="noStrike" cap="none" dirty="0">
                 <a:solidFill>
                   <a:schemeClr val="dk1"/>
                 </a:solidFill>
@@ -25490,7 +25539,7 @@
               <a:t>form of </a:t>
             </a:r>
             <a:r>
-              <a:rPr lang="en-US" sz="2800" b="0" i="0" u="sng" strike="noStrike" cap="none">
+              <a:rPr lang="en-US" sz="2800" b="0" i="0" u="sng" strike="noStrike" cap="none" dirty="0">
                 <a:solidFill>
                   <a:srgbClr val="3366FF"/>
                 </a:solidFill>
@@ -25502,7 +25551,7 @@
               <a:t>sampling</a:t>
             </a:r>
             <a:r>
-              <a:rPr lang="en-US" sz="2800" b="0" i="0" u="none" strike="noStrike" cap="none">
+              <a:rPr lang="en-US" sz="2800" b="0" i="0" u="none" strike="noStrike" cap="none" dirty="0">
                 <a:solidFill>
                   <a:srgbClr val="3366FF"/>
                 </a:solidFill>
@@ -25532,11 +25581,11 @@
               <a:buFont typeface="Arial"/>
             </a:pPr>
             <a:r>
-              <a:rPr lang="en-US"/>
+              <a:rPr lang="en-US" dirty="0"/>
               <a:t>Basic s</a:t>
             </a:r>
             <a:r>
-              <a:rPr lang="en-US" sz="2800" b="0" i="0" u="none" strike="noStrike" cap="none">
+              <a:rPr lang="en-US" sz="2800" b="0" i="0" u="none" strike="noStrike" cap="none" dirty="0">
                 <a:solidFill>
                   <a:schemeClr val="dk1"/>
                 </a:solidFill>
@@ -25548,7 +25597,7 @@
               <a:t>tatistical inference consists of</a:t>
             </a:r>
             <a:r>
-              <a:rPr lang="en-US"/>
+              <a:rPr lang="en-US" dirty="0"/>
               <a:t> the following steps:</a:t>
             </a:r>
           </a:p>
@@ -25593,7 +25642,7 @@
               <a:buAutoNum type="arabicPeriod"/>
             </a:pPr>
             <a:r>
-              <a:rPr lang="en-US" sz="2800">
+              <a:rPr lang="en-US" sz="2800" dirty="0">
                 <a:solidFill>
                   <a:schemeClr val="dk1"/>
                 </a:solidFill>
@@ -25620,7 +25669,7 @@
               <a:buAutoNum type="arabicPeriod"/>
             </a:pPr>
             <a:r>
-              <a:rPr lang="en-US" sz="2800" b="1" u="sng">
+              <a:rPr lang="en-US" sz="2800" b="1" u="sng" dirty="0">
                 <a:solidFill>
                   <a:schemeClr val="dk1"/>
                 </a:solidFill>
@@ -25632,7 +25681,7 @@
               <a:t>Selecting</a:t>
             </a:r>
             <a:r>
-              <a:rPr lang="en-US" sz="2800" b="1">
+              <a:rPr lang="en-US" sz="2800" b="1" dirty="0">
                 <a:solidFill>
                   <a:schemeClr val="dk1"/>
                 </a:solidFill>
@@ -25644,7 +25693,7 @@
               <a:t> a </a:t>
             </a:r>
             <a:r>
-              <a:rPr lang="en-US" sz="2800" b="1" u="sng">
+              <a:rPr lang="en-US" sz="2800" b="1" u="sng" dirty="0">
                 <a:solidFill>
                   <a:schemeClr val="dk1"/>
                 </a:solidFill>
@@ -25656,7 +25705,7 @@
               <a:t>statistical model</a:t>
             </a:r>
             <a:r>
-              <a:rPr lang="en-US" sz="2800">
+              <a:rPr lang="en-US" sz="2800" dirty="0">
                 <a:solidFill>
                   <a:schemeClr val="dk1"/>
                 </a:solidFill>
@@ -25665,7 +25714,7 @@
                 <a:cs typeface="Calibri"/>
                 <a:sym typeface="Calibri"/>
               </a:rPr>
-              <a:t> of the process that generates the population.</a:t>
+              <a:t> of the process that could be used to analyze the sample.</a:t>
             </a:r>
           </a:p>
           <a:p>
@@ -25683,7 +25732,7 @@
               <a:buAutoNum type="arabicPeriod"/>
             </a:pPr>
             <a:r>
-              <a:rPr lang="en-US" sz="2800">
+              <a:rPr lang="en-US" sz="2800" dirty="0">
                 <a:solidFill>
                   <a:schemeClr val="dk1"/>
                 </a:solidFill>
@@ -26240,9 +26289,74 @@
               <a:spcBef>
                 <a:spcPts val="0"/>
               </a:spcBef>
-              <a:buNone/>
-            </a:pPr>
-            <a:endParaRPr/>
+              <a:buFontTx/>
+              <a:buChar char="-"/>
+            </a:pPr>
+            <a:r>
+              <a:rPr lang="en-US" dirty="0"/>
+              <a:t>Test statistics effect</a:t>
+            </a:r>
+          </a:p>
+          <a:p>
+            <a:pPr lvl="0">
+              <a:spcBef>
+                <a:spcPts val="0"/>
+              </a:spcBef>
+              <a:buFontTx/>
+              <a:buChar char="-"/>
+            </a:pPr>
+            <a:r>
+              <a:rPr lang="en-US" dirty="0"/>
+              <a:t>P-value effect</a:t>
+            </a:r>
+          </a:p>
+          <a:p>
+            <a:pPr lvl="0">
+              <a:spcBef>
+                <a:spcPts val="0"/>
+              </a:spcBef>
+              <a:buFontTx/>
+              <a:buChar char="-"/>
+            </a:pPr>
+            <a:r>
+              <a:rPr lang="en-US" dirty="0"/>
+              <a:t>Small size effect</a:t>
+            </a:r>
+          </a:p>
+          <a:p>
+            <a:pPr lvl="0">
+              <a:spcBef>
+                <a:spcPts val="0"/>
+              </a:spcBef>
+              <a:buFontTx/>
+              <a:buChar char="-"/>
+            </a:pPr>
+            <a:r>
+              <a:rPr lang="en-US" dirty="0"/>
+              <a:t>Large size effect</a:t>
+            </a:r>
+          </a:p>
+          <a:p>
+            <a:pPr lvl="0">
+              <a:spcBef>
+                <a:spcPts val="0"/>
+              </a:spcBef>
+              <a:buFontTx/>
+              <a:buChar char="-"/>
+            </a:pPr>
+            <a:r>
+              <a:rPr lang="en-US"/>
+              <a:t>Multiple Comparisons</a:t>
+            </a:r>
+          </a:p>
+          <a:p>
+            <a:pPr marL="177800" lvl="0" indent="0">
+              <a:spcBef>
+                <a:spcPts val="0"/>
+              </a:spcBef>
+              <a:buNone/>
+            </a:pPr>
+            <a:endParaRPr dirty="0"/>
           </a:p>
         </p:txBody>
       </p:sp>
@@ -30620,27 +30734,27 @@
               </a:spcBef>
             </a:pPr>
             <a:r>
-              <a:rPr lang="en-US" b="1"/>
+              <a:rPr lang="en-US" b="1" dirty="0"/>
               <a:t>Frequency interpretation of probability</a:t>
             </a:r>
             <a:r>
-              <a:rPr lang="en-US"/>
+              <a:rPr lang="en-US" dirty="0"/>
               <a:t>: The probability of a given outcome can be interpreted as the proportion of times that the outcome occurs in an </a:t>
             </a:r>
             <a:r>
-              <a:rPr lang="en-US" b="1"/>
+              <a:rPr lang="en-US" b="1" dirty="0"/>
               <a:t>infinite</a:t>
             </a:r>
             <a:r>
-              <a:rPr lang="en-US"/>
+              <a:rPr lang="en-US" dirty="0"/>
               <a:t> set of </a:t>
             </a:r>
             <a:r>
-              <a:rPr lang="en-US" b="1"/>
+              <a:rPr lang="en-US" b="1" dirty="0"/>
               <a:t>identical, independent repetitions</a:t>
             </a:r>
             <a:r>
-              <a:rPr lang="en-US"/>
+              <a:rPr lang="en-US" dirty="0"/>
               <a:t> of the experiment. </a:t>
             </a:r>
           </a:p>
@@ -30654,19 +30768,19 @@
               </a:spcBef>
             </a:pPr>
             <a:r>
-              <a:rPr lang="en-US" b="1"/>
+              <a:rPr lang="en-US" b="1" dirty="0"/>
               <a:t>Frequency inference:</a:t>
             </a:r>
             <a:r>
-              <a:rPr lang="en-US"/>
+              <a:rPr lang="en-US" dirty="0"/>
               <a:t> Given a </a:t>
             </a:r>
             <a:r>
-              <a:rPr lang="en-US" b="1"/>
+              <a:rPr lang="en-US" b="1" dirty="0"/>
               <a:t>large enough</a:t>
             </a:r>
             <a:r>
-              <a:rPr lang="en-US"/>
+              <a:rPr lang="en-US" dirty="0"/>
               <a:t> sample size, the number of times that a particular outcome occurs is proportional to its probability. Therefore, we can make meaningful statements about the system that generated this sample.</a:t>
             </a:r>
           </a:p>
@@ -30680,15 +30794,15 @@
               </a:spcBef>
             </a:pPr>
             <a:r>
-              <a:rPr lang="en-US"/>
+              <a:rPr lang="en-US" dirty="0"/>
               <a:t>Frequency inference is the basis for </a:t>
             </a:r>
             <a:r>
-              <a:rPr lang="en-US" b="1"/>
+              <a:rPr lang="en-US" b="1" dirty="0"/>
               <a:t>hypothesis testing</a:t>
             </a:r>
             <a:r>
-              <a:rPr lang="en-US"/>
+              <a:rPr lang="en-US" dirty="0"/>
               <a:t>. </a:t>
             </a:r>
           </a:p>
@@ -30702,7 +30816,7 @@
               </a:spcBef>
             </a:pPr>
             <a:r>
-              <a:rPr lang="en-US"/>
+              <a:rPr lang="en-US" dirty="0"/>
               <a:t>A good approach when we want to know e.g. “Is this a fair coin?”</a:t>
             </a:r>
           </a:p>
@@ -33239,11 +33353,11 @@
               <a:buChar char="•"/>
             </a:pPr>
             <a:r>
-              <a:rPr lang="en-US"/>
+              <a:rPr lang="en-US" dirty="0"/>
               <a:t>Can be used to compare </a:t>
             </a:r>
             <a:r>
-              <a:rPr lang="en-US" b="0" i="0" u="none" strike="noStrike" cap="none">
+              <a:rPr lang="en-US" b="0" i="0" u="none" strike="noStrike" cap="none" dirty="0">
                 <a:solidFill>
                   <a:schemeClr val="dk1"/>
                 </a:solidFill>
@@ -33255,11 +33369,11 @@
               <a:t>two statistical data sets, or to </a:t>
             </a:r>
             <a:r>
-              <a:rPr lang="en-US"/>
+              <a:rPr lang="en-US" dirty="0"/>
               <a:t>compare </a:t>
             </a:r>
             <a:r>
-              <a:rPr lang="en-US" b="0" i="0" u="none" strike="noStrike" cap="none">
+              <a:rPr lang="en-US" b="0" i="0" u="none" strike="noStrike" cap="none" dirty="0">
                 <a:solidFill>
                   <a:schemeClr val="dk1"/>
                 </a:solidFill>
@@ -33271,11 +33385,11 @@
               <a:t>a data set obtained by sampling</a:t>
             </a:r>
             <a:r>
-              <a:rPr lang="en-US"/>
+              <a:rPr lang="en-US" dirty="0"/>
               <a:t> with </a:t>
             </a:r>
             <a:r>
-              <a:rPr lang="en-US" b="0" i="0" u="none" strike="noStrike" cap="none">
+              <a:rPr lang="en-US" b="0" i="0" u="none" strike="noStrike" cap="none" dirty="0">
                 <a:solidFill>
                   <a:schemeClr val="dk1"/>
                 </a:solidFill>
@@ -33287,11 +33401,11 @@
               <a:t>synthetic data</a:t>
             </a:r>
             <a:r>
-              <a:rPr lang="en-US"/>
+              <a:rPr lang="en-US" dirty="0"/>
               <a:t> </a:t>
             </a:r>
             <a:r>
-              <a:rPr lang="en-US" b="0" i="0" u="none" strike="noStrike" cap="none">
+              <a:rPr lang="en-US" b="0" i="0" u="none" strike="noStrike" cap="none" dirty="0">
                 <a:solidFill>
                   <a:schemeClr val="dk1"/>
                 </a:solidFill>
@@ -33322,11 +33436,11 @@
               <a:buChar char="•"/>
             </a:pPr>
             <a:r>
-              <a:rPr lang="en-US"/>
+              <a:rPr lang="en-US" dirty="0"/>
               <a:t>H</a:t>
             </a:r>
             <a:r>
-              <a:rPr lang="en-US" b="0" i="0" u="none" strike="noStrike" cap="none">
+              <a:rPr lang="en-US" b="0" i="0" u="none" strike="noStrike" cap="none" dirty="0">
                 <a:solidFill>
                   <a:schemeClr val="dk1"/>
                 </a:solidFill>
@@ -33338,11 +33452,11 @@
               <a:t>ypothesis tes</a:t>
             </a:r>
             <a:r>
-              <a:rPr lang="en-US"/>
+              <a:rPr lang="en-US" dirty="0"/>
               <a:t>ting allows us to distinguish--in a statistically meaningful way, between the </a:t>
             </a:r>
             <a:r>
-              <a:rPr lang="en-US" u="sng">
+              <a:rPr lang="en-US" u="sng" dirty="0">
                 <a:solidFill>
                   <a:schemeClr val="hlink"/>
                 </a:solidFill>
@@ -33351,11 +33465,11 @@
               <a:t>null hypothesis</a:t>
             </a:r>
             <a:r>
-              <a:rPr lang="en-US"/>
+              <a:rPr lang="en-US" dirty="0"/>
               <a:t> and an </a:t>
             </a:r>
             <a:r>
-              <a:rPr lang="en-US" b="0" i="0" u="sng" strike="noStrike" cap="none">
+              <a:rPr lang="en-US" b="0" i="0" u="sng" strike="noStrike" cap="none" dirty="0">
                 <a:solidFill>
                   <a:schemeClr val="hlink"/>
                 </a:solidFill>
@@ -33368,11 +33482,11 @@
               <a:t>alternative</a:t>
             </a:r>
             <a:r>
-              <a:rPr lang="en-US"/>
+              <a:rPr lang="en-US" dirty="0"/>
               <a:t> that we propose to test.</a:t>
             </a:r>
             <a:r>
-              <a:rPr lang="en-US" b="0" i="0" u="none" strike="noStrike" cap="none">
+              <a:rPr lang="en-US" b="0" i="0" u="none" strike="noStrike" cap="none" dirty="0">
                 <a:solidFill>
                   <a:schemeClr val="dk1"/>
                 </a:solidFill>
@@ -33403,8 +33517,12 @@
               <a:buChar char="•"/>
             </a:pPr>
             <a:r>
-              <a:rPr lang="en-US"/>
-              <a:t>Eg., We want to test whether singing to a Lima bean makes it grow faster. </a:t>
+              <a:rPr lang="en-US" dirty="0" err="1"/>
+              <a:t>Eg</a:t>
+            </a:r>
+            <a:r>
+              <a:rPr lang="en-US" dirty="0"/>
+              <a:t>., We want to test whether singing to a Lima bean makes it grow faster. </a:t>
             </a:r>
           </a:p>
           <a:p>
@@ -33420,7 +33538,7 @@
               </a:spcAft>
             </a:pPr>
             <a:r>
-              <a:rPr lang="en-US"/>
+              <a:rPr lang="en-US" dirty="0"/>
               <a:t>Null hypothesis: the mean heights of bean sprouts after 10 days are equal for beans that have been sung to, and a non-musical control group.</a:t>
             </a:r>
           </a:p>
@@ -33437,7 +33555,7 @@
               </a:spcAft>
             </a:pPr>
             <a:r>
-              <a:rPr lang="en-US"/>
+              <a:rPr lang="en-US" dirty="0"/>
               <a:t>Alternate hypothesis: The mean height of the beans in the sung-to group is larger than that of the control group. </a:t>
             </a:r>
           </a:p>

</xml_diff>

<commit_message>
Added and modified some examples
</commit_message>
<xml_diff>
--- a/Statistical Inference.pptx
+++ b/Statistical Inference.pptx
@@ -19592,7 +19592,7 @@
               <a:buNone/>
             </a:pPr>
             <a:r>
-              <a:rPr lang="en-US"/>
+              <a:rPr lang="en-US" dirty="0"/>
               <a:t>Say we flip a coin 100 times and end up with the following results:</a:t>
             </a:r>
           </a:p>
@@ -19603,7 +19603,7 @@
               </a:spcBef>
             </a:pPr>
             <a:r>
-              <a:rPr lang="en-US"/>
+              <a:rPr lang="en-US" dirty="0"/>
               <a:t>The coin lands HEADS 66 times</a:t>
             </a:r>
           </a:p>
@@ -19614,7 +19614,7 @@
               </a:spcBef>
             </a:pPr>
             <a:r>
-              <a:rPr lang="en-US"/>
+              <a:rPr lang="en-US" dirty="0"/>
               <a:t>The coin lands TAILS 34 times</a:t>
             </a:r>
           </a:p>
@@ -19626,7 +19626,7 @@
               <a:buNone/>
             </a:pPr>
             <a:r>
-              <a:rPr lang="en-US"/>
+              <a:rPr lang="en-US" dirty="0"/>
               <a:t>Can we conclude that the coin is biased?</a:t>
             </a:r>
           </a:p>
@@ -19638,15 +19638,15 @@
               <a:buNone/>
             </a:pPr>
             <a:r>
-              <a:rPr lang="en-US"/>
+              <a:rPr lang="en-US" dirty="0"/>
               <a:t>Here, the </a:t>
             </a:r>
             <a:r>
-              <a:rPr lang="en-US" b="1"/>
+              <a:rPr lang="en-US" b="1" dirty="0"/>
               <a:t>null hypothesis</a:t>
             </a:r>
             <a:r>
-              <a:rPr lang="en-US"/>
+              <a:rPr lang="en-US" dirty="0"/>
               <a:t> is that we have a fair coin:</a:t>
             </a:r>
           </a:p>
@@ -19658,7 +19658,7 @@
               <a:buNone/>
             </a:pPr>
             <a:r>
-              <a:rPr lang="en-US" i="1"/>
+              <a:rPr lang="en-US" i="1" dirty="0"/>
               <a:t>p(HEADS) = p(TAILS) = ½</a:t>
             </a:r>
           </a:p>
@@ -19670,15 +19670,15 @@
               <a:buNone/>
             </a:pPr>
             <a:r>
-              <a:rPr lang="en-US"/>
+              <a:rPr lang="en-US" dirty="0"/>
               <a:t>And the alternate hypothesis is that the coin is </a:t>
             </a:r>
             <a:r>
-              <a:rPr lang="en-US" b="1"/>
+              <a:rPr lang="en-US" b="1" dirty="0"/>
               <a:t>not</a:t>
             </a:r>
             <a:r>
-              <a:rPr lang="en-US"/>
+              <a:rPr lang="en-US" dirty="0"/>
               <a:t> fair. </a:t>
             </a:r>
           </a:p>
@@ -20882,7 +20882,7 @@
               <a:buNone/>
             </a:pPr>
             <a:r>
-              <a:rPr lang="en-US" sz="2800">
+              <a:rPr lang="en-US" sz="2800" dirty="0">
                 <a:solidFill>
                   <a:srgbClr val="CC0000"/>
                 </a:solidFill>
@@ -23263,7 +23263,7 @@
               <a:buNone/>
             </a:pPr>
             <a:r>
-              <a:rPr lang="en-US"/>
+              <a:rPr lang="en-US" dirty="0"/>
               <a:t>Say I have two coins. I’ve been fiddling with the second coin, filing the edges and so on, in an attempt to see whether I can increase the probability of getting “Heads”.  I want to test whether all this work paid off. </a:t>
             </a:r>
           </a:p>
@@ -23275,7 +23275,7 @@
               <a:buNone/>
             </a:pPr>
             <a:r>
-              <a:rPr lang="en-US"/>
+              <a:rPr lang="en-US" dirty="0"/>
               <a:t>Say p1 is the probability of rolling heads with the unmodified coin, and p2 is the probability of rolling heads with the second, modified coin.</a:t>
             </a:r>
           </a:p>
@@ -23287,11 +23287,11 @@
               <a:buNone/>
             </a:pPr>
             <a:r>
-              <a:rPr lang="en-US" b="1"/>
+              <a:rPr lang="en-US" b="1" dirty="0"/>
               <a:t>Null hypothesis</a:t>
             </a:r>
             <a:r>
-              <a:rPr lang="en-US"/>
+              <a:rPr lang="en-US" dirty="0"/>
               <a:t>: There is no difference between p1 and p2.</a:t>
             </a:r>
           </a:p>
@@ -23303,11 +23303,11 @@
               <a:buNone/>
             </a:pPr>
             <a:r>
-              <a:rPr lang="en-US" b="1"/>
+              <a:rPr lang="en-US" b="1" dirty="0"/>
               <a:t>Alternative hypothesis</a:t>
             </a:r>
             <a:r>
-              <a:rPr lang="en-US"/>
+              <a:rPr lang="en-US" dirty="0"/>
               <a:t>: The probability p2 is higher than p1. </a:t>
             </a:r>
           </a:p>
@@ -23752,11 +23752,11 @@
               <a:buNone/>
             </a:pPr>
             <a:r>
-              <a:rPr lang="en-US"/>
+              <a:rPr lang="en-US" dirty="0"/>
               <a:t>Another Way to Go: </a:t>
             </a:r>
             <a:r>
-              <a:rPr lang="en-US" i="0" u="none" strike="noStrike" cap="none">
+              <a:rPr lang="en-US" i="0" u="none" strike="noStrike" cap="none" dirty="0">
                 <a:solidFill>
                   <a:schemeClr val="dk1"/>
                 </a:solidFill>
@@ -23768,11 +23768,11 @@
               <a:t>Analysis of </a:t>
             </a:r>
             <a:r>
-              <a:rPr lang="en-US"/>
+              <a:rPr lang="en-US" dirty="0"/>
               <a:t>V</a:t>
             </a:r>
             <a:r>
-              <a:rPr lang="en-US" i="0" u="none" strike="noStrike" cap="none">
+              <a:rPr lang="en-US" i="0" u="none" strike="noStrike" cap="none" dirty="0">
                 <a:solidFill>
                   <a:schemeClr val="dk1"/>
                 </a:solidFill>
@@ -23833,7 +23833,7 @@
               <a:buChar char="•"/>
             </a:pPr>
             <a:r>
-              <a:rPr lang="en-US" sz="2590" b="0" i="0" u="none" strike="noStrike" cap="none">
+              <a:rPr lang="en-US" sz="2590" b="0" i="0" u="none" strike="noStrike" cap="none" dirty="0">
                 <a:solidFill>
                   <a:schemeClr val="dk1"/>
                 </a:solidFill>
@@ -23845,7 +23845,7 @@
               <a:t>A collection of </a:t>
             </a:r>
             <a:r>
-              <a:rPr lang="en-US" sz="2590" b="0" i="0" u="sng" strike="noStrike" cap="none">
+              <a:rPr lang="en-US" sz="2590" b="0" i="0" u="sng" strike="noStrike" cap="none" dirty="0">
                 <a:solidFill>
                   <a:schemeClr val="hlink"/>
                 </a:solidFill>
@@ -23858,7 +23858,7 @@
               <a:t>statistical models</a:t>
             </a:r>
             <a:r>
-              <a:rPr lang="en-US" sz="2590" b="0" i="0" u="none" strike="noStrike" cap="none">
+              <a:rPr lang="en-US" sz="2590" b="0" i="0" u="none" strike="noStrike" cap="none" dirty="0">
                 <a:solidFill>
                   <a:schemeClr val="dk1"/>
                 </a:solidFill>
@@ -23870,7 +23870,7 @@
               <a:t> used to analyze the differences among group means and their associated procedures (such as "variation" among and between groups), developed by </a:t>
             </a:r>
             <a:r>
-              <a:rPr lang="en-US" sz="2590" b="0" i="0" u="sng" strike="noStrike" cap="none">
+              <a:rPr lang="en-US" sz="2590" b="0" i="0" u="sng" strike="noStrike" cap="none" dirty="0">
                 <a:solidFill>
                   <a:schemeClr val="hlink"/>
                 </a:solidFill>
@@ -23883,7 +23883,7 @@
               <a:t>Ronald Fisher</a:t>
             </a:r>
             <a:r>
-              <a:rPr lang="en-US" sz="2590" b="0" i="0" u="none" strike="noStrike" cap="none">
+              <a:rPr lang="en-US" sz="2590" b="0" i="0" u="none" strike="noStrike" cap="none" dirty="0">
                 <a:solidFill>
                   <a:schemeClr val="dk1"/>
                 </a:solidFill>
@@ -23914,7 +23914,7 @@
               <a:buChar char="•"/>
             </a:pPr>
             <a:r>
-              <a:rPr lang="en-US" sz="2590" b="0" i="0" u="none" strike="noStrike" cap="none">
+              <a:rPr lang="en-US" sz="2590" b="0" i="0" u="none" strike="noStrike" cap="none" dirty="0">
                 <a:solidFill>
                   <a:schemeClr val="dk1"/>
                 </a:solidFill>
@@ -23926,7 +23926,7 @@
               <a:t>The observed </a:t>
             </a:r>
             <a:r>
-              <a:rPr lang="en-US" sz="2590" b="0" i="0" u="sng" strike="noStrike" cap="none">
+              <a:rPr lang="en-US" sz="2590" b="0" i="0" u="sng" strike="noStrike" cap="none" dirty="0">
                 <a:solidFill>
                   <a:schemeClr val="hlink"/>
                 </a:solidFill>
@@ -23939,7 +23939,7 @@
               <a:t>variance</a:t>
             </a:r>
             <a:r>
-              <a:rPr lang="en-US" sz="2590" b="0" i="0" u="none" strike="noStrike" cap="none">
+              <a:rPr lang="en-US" sz="2590" b="0" i="0" u="none" strike="noStrike" cap="none" dirty="0">
                 <a:solidFill>
                   <a:schemeClr val="dk1"/>
                 </a:solidFill>
@@ -23970,7 +23970,7 @@
               <a:buChar char="•"/>
             </a:pPr>
             <a:r>
-              <a:rPr lang="en-US" sz="2590" b="0" i="0" u="none" strike="noStrike" cap="none">
+              <a:rPr lang="en-US" sz="2590" b="0" i="0" u="none" strike="noStrike" cap="none" dirty="0">
                 <a:solidFill>
                   <a:schemeClr val="dk1"/>
                 </a:solidFill>
@@ -23982,7 +23982,7 @@
               <a:t>It provides a </a:t>
             </a:r>
             <a:r>
-              <a:rPr lang="en-US" sz="2590" b="0" i="0" u="sng" strike="noStrike" cap="none">
+              <a:rPr lang="en-US" sz="2590" b="0" i="0" u="sng" strike="noStrike" cap="none" dirty="0">
                 <a:solidFill>
                   <a:schemeClr val="hlink"/>
                 </a:solidFill>
@@ -23995,7 +23995,7 @@
               <a:t>statistical test</a:t>
             </a:r>
             <a:r>
-              <a:rPr lang="en-US" sz="2590" b="0" i="0" u="none" strike="noStrike" cap="none">
+              <a:rPr lang="en-US" sz="2590" b="0" i="0" u="none" strike="noStrike" cap="none" dirty="0">
                 <a:solidFill>
                   <a:schemeClr val="dk1"/>
                 </a:solidFill>
@@ -24007,7 +24007,7 @@
               <a:t> of whether or not the </a:t>
             </a:r>
             <a:r>
-              <a:rPr lang="en-US" sz="2590" b="0" i="0" u="sng" strike="noStrike" cap="none">
+              <a:rPr lang="en-US" sz="2590" b="0" i="0" u="sng" strike="noStrike" cap="none" dirty="0">
                 <a:solidFill>
                   <a:schemeClr val="hlink"/>
                 </a:solidFill>
@@ -24020,7 +24020,7 @@
               <a:t>means</a:t>
             </a:r>
             <a:r>
-              <a:rPr lang="en-US" sz="2590" b="0" i="0" u="none" strike="noStrike" cap="none">
+              <a:rPr lang="en-US" sz="2590" b="0" i="0" u="none" strike="noStrike" cap="none" dirty="0">
                 <a:solidFill>
                   <a:schemeClr val="dk1"/>
                 </a:solidFill>
@@ -24032,7 +24032,7 @@
               <a:t> of several groups are equal, and therefore generalizes the </a:t>
             </a:r>
             <a:r>
-              <a:rPr lang="en-US" sz="2590" b="0" i="1" u="sng" strike="noStrike" cap="none">
+              <a:rPr lang="en-US" sz="2590" b="0" i="1" u="sng" strike="noStrike" cap="none" dirty="0">
                 <a:solidFill>
                   <a:schemeClr val="hlink"/>
                 </a:solidFill>
@@ -24045,7 +24045,7 @@
               <a:t>t</a:t>
             </a:r>
             <a:r>
-              <a:rPr lang="en-US" sz="2590" b="0" i="0" u="sng" strike="noStrike" cap="none">
+              <a:rPr lang="en-US" sz="2590" b="0" i="0" u="sng" strike="noStrike" cap="none" dirty="0">
                 <a:solidFill>
                   <a:schemeClr val="hlink"/>
                 </a:solidFill>
@@ -24058,7 +24058,7 @@
               <a:t>-test</a:t>
             </a:r>
             <a:r>
-              <a:rPr lang="en-US" sz="2590" b="0" i="0" u="none" strike="noStrike" cap="none">
+              <a:rPr lang="en-US" sz="2590" b="0" i="0" u="none" strike="noStrike" cap="none" dirty="0">
                 <a:solidFill>
                   <a:schemeClr val="dk1"/>
                 </a:solidFill>
@@ -24089,7 +24089,7 @@
               <a:buChar char="•"/>
             </a:pPr>
             <a:r>
-              <a:rPr lang="en-US" sz="2590" b="0" i="0" u="none" strike="noStrike" cap="none">
+              <a:rPr lang="en-US" sz="2590" b="0" i="0" u="none" strike="noStrike" cap="none" dirty="0">
                 <a:solidFill>
                   <a:schemeClr val="dk1"/>
                 </a:solidFill>
@@ -24101,7 +24101,7 @@
               <a:t>Useful for comparing (testing) three or more means (groups or variables) for </a:t>
             </a:r>
             <a:r>
-              <a:rPr lang="en-US" sz="2590" b="0" i="0" u="sng" strike="noStrike" cap="none">
+              <a:rPr lang="en-US" sz="2590" b="0" i="0" u="sng" strike="noStrike" cap="none" dirty="0">
                 <a:solidFill>
                   <a:schemeClr val="hlink"/>
                 </a:solidFill>
@@ -24114,7 +24114,7 @@
               <a:t>statistical significance</a:t>
             </a:r>
             <a:r>
-              <a:rPr lang="en-US" sz="2590" b="0" i="0" u="none" strike="noStrike" cap="none">
+              <a:rPr lang="en-US" sz="2590" b="0" i="0" u="none" strike="noStrike" cap="none" dirty="0">
                 <a:solidFill>
                   <a:schemeClr val="dk1"/>
                 </a:solidFill>
@@ -24145,7 +24145,7 @@
               <a:buChar char="•"/>
             </a:pPr>
             <a:r>
-              <a:rPr lang="en-US" sz="2590" b="0" i="0" u="none" strike="noStrike" cap="none">
+              <a:rPr lang="en-US" sz="2590" b="0" i="0" u="none" strike="noStrike" cap="none" dirty="0">
                 <a:solidFill>
                   <a:schemeClr val="dk1"/>
                 </a:solidFill>
@@ -24157,7 +24157,7 @@
               <a:t>Conceptually similar to </a:t>
             </a:r>
             <a:r>
-              <a:rPr lang="en-US" sz="2590" b="0" i="0" u="sng" strike="noStrike" cap="none">
+              <a:rPr lang="en-US" sz="2590" b="0" i="0" u="sng" strike="noStrike" cap="none" dirty="0">
                 <a:solidFill>
                   <a:schemeClr val="hlink"/>
                 </a:solidFill>
@@ -24170,7 +24170,7 @@
               <a:t>multiple two-sample t-tests</a:t>
             </a:r>
             <a:r>
-              <a:rPr lang="en-US" sz="2590" b="0" i="0" u="none" strike="noStrike" cap="none">
+              <a:rPr lang="en-US" sz="2590" b="0" i="0" u="none" strike="noStrike" cap="none" dirty="0">
                 <a:solidFill>
                   <a:schemeClr val="dk1"/>
                 </a:solidFill>
@@ -24182,7 +24182,7 @@
               <a:t>, but is less conservative (results in less </a:t>
             </a:r>
             <a:r>
-              <a:rPr lang="en-US" sz="2590" b="0" i="0" u="sng" strike="noStrike" cap="none">
+              <a:rPr lang="en-US" sz="2590" b="0" i="0" u="sng" strike="noStrike" cap="none" dirty="0">
                 <a:solidFill>
                   <a:schemeClr val="hlink"/>
                 </a:solidFill>
@@ -24195,7 +24195,7 @@
               <a:t>type I error</a:t>
             </a:r>
             <a:r>
-              <a:rPr lang="en-US" sz="2590" b="0" i="0" u="none" strike="noStrike" cap="none">
+              <a:rPr lang="en-US" sz="2590" b="0" i="0" u="none" strike="noStrike" cap="none" dirty="0">
                 <a:solidFill>
                   <a:schemeClr val="dk1"/>
                 </a:solidFill>
@@ -24339,7 +24339,7 @@
               <a:buChar char="•"/>
             </a:pPr>
             <a:r>
-              <a:rPr lang="en-US" sz="2800" b="0" i="0" u="none" strike="noStrike" cap="none">
+              <a:rPr lang="en-US" sz="2800" b="0" i="0" u="none" strike="noStrike" cap="none" dirty="0">
                 <a:solidFill>
                   <a:schemeClr val="dk1"/>
                 </a:solidFill>
@@ -24351,7 +24351,7 @@
               <a:t>ANOVA generalizes to the study of the effects of multiple factors. When the experiment includes observations at all combinations of levels of each factor, it is termed </a:t>
             </a:r>
             <a:r>
-              <a:rPr lang="en-US" sz="2800" b="0" i="0" u="sng" strike="noStrike" cap="none">
+              <a:rPr lang="en-US" sz="2800" b="0" i="0" u="sng" strike="noStrike" cap="none" dirty="0">
                 <a:solidFill>
                   <a:schemeClr val="hlink"/>
                 </a:solidFill>
@@ -24364,7 +24364,7 @@
               <a:t>factorial</a:t>
             </a:r>
             <a:r>
-              <a:rPr lang="en-US" sz="2800" b="0" i="0" u="none" strike="noStrike" cap="none">
+              <a:rPr lang="en-US" sz="2800" b="0" i="0" u="none" strike="noStrike" cap="none" dirty="0">
                 <a:solidFill>
                   <a:schemeClr val="dk1"/>
                 </a:solidFill>
@@ -24395,7 +24395,7 @@
               <a:buChar char="•"/>
             </a:pPr>
             <a:r>
-              <a:rPr lang="en-US" sz="2800" b="0" i="0" u="none" strike="noStrike" cap="none">
+              <a:rPr lang="en-US" sz="2800" b="0" i="0" u="none" strike="noStrike" cap="none" dirty="0">
                 <a:solidFill>
                   <a:schemeClr val="dk1"/>
                 </a:solidFill>
@@ -24422,7 +24422,7 @@
               <a:buFont typeface="Arial"/>
               <a:buNone/>
             </a:pPr>
-            <a:endParaRPr sz="2800" b="0" i="0" u="none" strike="noStrike" cap="none">
+            <a:endParaRPr sz="2800" b="0" i="0" u="none" strike="noStrike" cap="none" dirty="0">
               <a:solidFill>
                 <a:schemeClr val="dk1"/>
               </a:solidFill>
@@ -24678,8 +24678,8 @@
         </p:nvSpPr>
         <p:spPr>
           <a:xfrm>
-            <a:off x="242100" y="1009775"/>
-            <a:ext cx="11784900" cy="5764200"/>
+            <a:off x="242100" y="978195"/>
+            <a:ext cx="11784900" cy="5795780"/>
           </a:xfrm>
           <a:prstGeom prst="rect">
             <a:avLst/>
@@ -27581,7 +27581,6 @@
               <a:rPr lang="en-US" dirty="0"/>
               <a:t>) </a:t>
             </a:r>
-            <a:endParaRPr lang="en-US" dirty="0"/>
           </a:p>
           <a:p>
             <a:pPr lvl="0" rtl="0">
@@ -29634,8 +29633,24 @@
               <a:buNone/>
             </a:pPr>
             <a:r>
-              <a:rPr lang="en-US"/>
-              <a:t>P(Model 1|Obs)/P(Model 2|Obs) = P(Obs|Model 1)/P(Obs|Model 2)</a:t>
+              <a:rPr lang="en-US" dirty="0"/>
+              <a:t>P(Model 1|Obs)/P(Model 2|Obs) = P(</a:t>
+            </a:r>
+            <a:r>
+              <a:rPr lang="en-US" dirty="0" err="1"/>
+              <a:t>Obs|Model</a:t>
+            </a:r>
+            <a:r>
+              <a:rPr lang="en-US" dirty="0"/>
+              <a:t> 1)/P(</a:t>
+            </a:r>
+            <a:r>
+              <a:rPr lang="en-US" dirty="0" err="1"/>
+              <a:t>Obs|Model</a:t>
+            </a:r>
+            <a:r>
+              <a:rPr lang="en-US" dirty="0"/>
+              <a:t> 2)</a:t>
             </a:r>
           </a:p>
           <a:p>
@@ -29645,7 +29660,7 @@
               </a:spcBef>
             </a:pPr>
             <a:r>
-              <a:rPr lang="en-US" u="sng">
+              <a:rPr lang="en-US" u="sng" dirty="0">
                 <a:solidFill>
                   <a:schemeClr val="hlink"/>
                 </a:solidFill>
@@ -29654,7 +29669,7 @@
               <a:t>Bayes Factor</a:t>
             </a:r>
             <a:r>
-              <a:rPr lang="en-US"/>
+              <a:rPr lang="en-US" dirty="0"/>
               <a:t> is defined as:</a:t>
             </a:r>
           </a:p>
@@ -29666,8 +29681,24 @@
               <a:buNone/>
             </a:pPr>
             <a:r>
-              <a:rPr lang="en-US" b="1"/>
-              <a:t>K = P(Obs|Model 1)/P(Obs|Model 2)</a:t>
+              <a:rPr lang="en-US" b="1" dirty="0"/>
+              <a:t>K = P(</a:t>
+            </a:r>
+            <a:r>
+              <a:rPr lang="en-US" b="1" dirty="0" err="1"/>
+              <a:t>Obs|Model</a:t>
+            </a:r>
+            <a:r>
+              <a:rPr lang="en-US" b="1" dirty="0"/>
+              <a:t> 1)/P(</a:t>
+            </a:r>
+            <a:r>
+              <a:rPr lang="en-US" b="1" dirty="0" err="1"/>
+              <a:t>Obs|Model</a:t>
+            </a:r>
+            <a:r>
+              <a:rPr lang="en-US" b="1" dirty="0"/>
+              <a:t> 2)</a:t>
             </a:r>
           </a:p>
           <a:p>
@@ -29677,7 +29708,7 @@
               </a:spcBef>
             </a:pPr>
             <a:r>
-              <a:rPr lang="en-US"/>
+              <a:rPr lang="en-US" dirty="0"/>
               <a:t>If K is close to 1, the data does not distinguish between the two models; </a:t>
             </a:r>
           </a:p>
@@ -29688,7 +29719,7 @@
               </a:spcBef>
             </a:pPr>
             <a:r>
-              <a:rPr lang="en-US"/>
+              <a:rPr lang="en-US" dirty="0"/>
               <a:t>If K is much smaller than 1, observations support Model 2; </a:t>
             </a:r>
           </a:p>
@@ -29699,7 +29730,7 @@
               </a:spcBef>
             </a:pPr>
             <a:r>
-              <a:rPr lang="en-US"/>
+              <a:rPr lang="en-US" dirty="0"/>
               <a:t>If K is much larger than 1, observations support Model 1. </a:t>
             </a:r>
           </a:p>

</xml_diff>